<commit_message>
presentation finalised, final commit
</commit_message>
<xml_diff>
--- a/documentation/My Project.pptx
+++ b/documentation/My Project.pptx
@@ -119,6 +119,11 @@
       </a:defRPr>
     </a:lvl9pPr>
   </p:defaultTextStyle>
+  <p:extLst>
+    <p:ext uri="{EFAFB233-063F-42B5-8137-9DF3F51BA10A}">
+      <p15:sldGuideLst xmlns:p15="http://schemas.microsoft.com/office/powerpoint/2012/main"/>
+    </p:ext>
+  </p:extLst>
 </p:presentation>
 </file>
 
@@ -4829,14 +4834,28 @@
             <a:pPr lvl="1"/>
             <a:r>
               <a:rPr lang="en-GB" dirty="0"/>
-              <a:t>Requires functionality to add, view update and delete customers, products and orders</a:t>
+              <a:t>Add, view update and delete customers and items</a:t>
             </a:r>
           </a:p>
           <a:p>
             <a:pPr lvl="1"/>
             <a:r>
               <a:rPr lang="en-GB" dirty="0"/>
-              <a:t>Adding and deleting individual items from orders.</a:t>
+              <a:t>Create, view and delete orders</a:t>
+            </a:r>
+          </a:p>
+          <a:p>
+            <a:pPr lvl="1"/>
+            <a:r>
+              <a:rPr lang="en-GB" dirty="0"/>
+              <a:t>Add or delete items for an order</a:t>
+            </a:r>
+          </a:p>
+          <a:p>
+            <a:pPr lvl="2"/>
+            <a:r>
+              <a:rPr lang="en-GB" dirty="0"/>
+              <a:t>Calculate a cost for the order</a:t>
             </a:r>
           </a:p>
           <a:p>
@@ -4844,10 +4863,8 @@
             <a:endParaRPr lang="en-GB" dirty="0"/>
           </a:p>
           <a:p>
-            <a:r>
-              <a:rPr lang="en-GB" dirty="0"/>
-              <a:t>Created in Java</a:t>
-            </a:r>
+            <a:pPr lvl="1"/>
+            <a:endParaRPr lang="en-GB" dirty="0"/>
           </a:p>
           <a:p>
             <a:pPr lvl="1"/>
@@ -5176,6 +5193,36 @@
           </a:prstGeom>
         </p:spPr>
       </p:pic>
+      <p:pic>
+        <p:nvPicPr>
+          <p:cNvPr id="5" name="Picture 4">
+            <a:extLst>
+              <a:ext uri="{FF2B5EF4-FFF2-40B4-BE49-F238E27FC236}">
+                <a16:creationId xmlns:a16="http://schemas.microsoft.com/office/drawing/2014/main" id="{B8C7D1CF-9BD4-4317-998B-C41587594E58}"/>
+              </a:ext>
+            </a:extLst>
+          </p:cNvPr>
+          <p:cNvPicPr>
+            <a:picLocks noChangeAspect="1"/>
+          </p:cNvPicPr>
+          <p:nvPr/>
+        </p:nvPicPr>
+        <p:blipFill>
+          <a:blip r:embed="rId3"/>
+          <a:stretch>
+            <a:fillRect/>
+          </a:stretch>
+        </p:blipFill>
+        <p:spPr>
+          <a:xfrm>
+            <a:off x="5413252" y="93307"/>
+            <a:ext cx="2825679" cy="6370085"/>
+          </a:xfrm>
+          <a:prstGeom prst="rect">
+            <a:avLst/>
+          </a:prstGeom>
+        </p:spPr>
+      </p:pic>
     </p:spTree>
     <p:extLst>
       <p:ext uri="{BB962C8B-B14F-4D97-AF65-F5344CB8AC3E}">
@@ -5861,7 +5908,12 @@
             <p:ph idx="1"/>
           </p:nvPr>
         </p:nvSpPr>
-        <p:spPr/>
+        <p:spPr>
+          <a:xfrm>
+            <a:off x="1097280" y="1845734"/>
+            <a:ext cx="3950970" cy="4023360"/>
+          </a:xfrm>
+        </p:spPr>
         <p:txBody>
           <a:bodyPr/>
           <a:lstStyle/>
@@ -5892,7 +5944,7 @@
         </p:blipFill>
         <p:spPr>
           <a:xfrm>
-            <a:off x="4248150" y="5459519"/>
+            <a:off x="2238375" y="4202656"/>
             <a:ext cx="7715250" cy="819150"/>
           </a:xfrm>
           <a:prstGeom prst="rect">
@@ -5902,10 +5954,10 @@
       </p:pic>
       <p:pic>
         <p:nvPicPr>
-          <p:cNvPr id="5" name="Picture 4">
+          <p:cNvPr id="7" name="Picture 6">
             <a:extLst>
               <a:ext uri="{FF2B5EF4-FFF2-40B4-BE49-F238E27FC236}">
-                <a16:creationId xmlns:a16="http://schemas.microsoft.com/office/drawing/2014/main" id="{704A5729-F399-4AB3-BEDA-2F5EE523372C}"/>
+                <a16:creationId xmlns:a16="http://schemas.microsoft.com/office/drawing/2014/main" id="{515A1D58-F3EB-4D61-A666-359DE73199BC}"/>
               </a:ext>
             </a:extLst>
           </p:cNvPr>
@@ -5922,38 +5974,8 @@
         </p:blipFill>
         <p:spPr>
           <a:xfrm>
-            <a:off x="5048250" y="3100177"/>
-            <a:ext cx="6115050" cy="2343150"/>
-          </a:xfrm>
-          <a:prstGeom prst="rect">
-            <a:avLst/>
-          </a:prstGeom>
-        </p:spPr>
-      </p:pic>
-      <p:pic>
-        <p:nvPicPr>
-          <p:cNvPr id="6" name="Picture 5">
-            <a:extLst>
-              <a:ext uri="{FF2B5EF4-FFF2-40B4-BE49-F238E27FC236}">
-                <a16:creationId xmlns:a16="http://schemas.microsoft.com/office/drawing/2014/main" id="{B07794F4-03E6-40D9-815C-C87D14ECB1F9}"/>
-              </a:ext>
-            </a:extLst>
-          </p:cNvPr>
-          <p:cNvPicPr>
-            <a:picLocks noChangeAspect="1"/>
-          </p:cNvPicPr>
-          <p:nvPr/>
-        </p:nvPicPr>
-        <p:blipFill>
-          <a:blip r:embed="rId4"/>
-          <a:stretch>
-            <a:fillRect/>
-          </a:stretch>
-        </p:blipFill>
-        <p:spPr>
-          <a:xfrm>
-            <a:off x="5343525" y="280777"/>
-            <a:ext cx="5524500" cy="2800350"/>
+            <a:off x="3062811" y="3076443"/>
+            <a:ext cx="5857875" cy="495300"/>
           </a:xfrm>
           <a:prstGeom prst="rect">
             <a:avLst/>

</xml_diff>